<commit_message>
week 0 ppt size reduced
</commit_message>
<xml_diff>
--- a/slides/intro_to_cis440.pptx
+++ b/slides/intro_to_cis440.pptx
@@ -4712,11 +4712,7 @@
           <a:p>
             <a:r>
               <a:rPr lang="en-US" dirty="0" smtClean="0"/>
-              <a:t>Critical assumptions of CIS </a:t>
-            </a:r>
-            <a:r>
-              <a:rPr lang="en-US" dirty="0" smtClean="0"/>
-              <a:t>440</a:t>
+              <a:t>Critical assumptions of CIS 440</a:t>
             </a:r>
             <a:endParaRPr lang="en-US" dirty="0"/>
           </a:p>
@@ -4764,17 +4760,8 @@
           <a:p>
             <a:r>
               <a:rPr lang="en-US" dirty="0" smtClean="0"/>
-              <a:t>The easiest and most importan</a:t>
-            </a:r>
-            <a:r>
-              <a:rPr lang="en-US" dirty="0" smtClean="0"/>
-              <a:t>t “Agile” technique is the retrospective</a:t>
-            </a:r>
-            <a:r>
-              <a:rPr lang="en-US" dirty="0" smtClean="0"/>
-              <a:t>.</a:t>
-            </a:r>
-            <a:endParaRPr lang="en-US" dirty="0" smtClean="0"/>
+              <a:t>The easiest and most important “Agile” technique is the retrospective.</a:t>
+            </a:r>
           </a:p>
           <a:p>
             <a:r>
@@ -4799,14 +4786,14 @@
           <p:nvPr/>
         </p:nvPicPr>
         <p:blipFill rotWithShape="1">
-          <a:blip r:embed="rId2">
+          <a:blip r:embed="rId2" cstate="email">
             <a:extLst>
               <a:ext uri="{28A0092B-C50C-407E-A947-70E740481C1C}">
-                <a14:useLocalDpi xmlns:a14="http://schemas.microsoft.com/office/drawing/2010/main" val="0"/>
+                <a14:useLocalDpi xmlns:a14="http://schemas.microsoft.com/office/drawing/2010/main"/>
               </a:ext>
             </a:extLst>
           </a:blip>
-          <a:srcRect l="12310" t="16901" r="10575" b="10147"/>
+          <a:srcRect/>
           <a:stretch/>
         </p:blipFill>
         <p:spPr bwMode="auto">
@@ -5614,7 +5601,7 @@
           </p:nvPr>
         </p:nvPicPr>
         <p:blipFill>
-          <a:blip r:embed="rId2" cstate="screen">
+          <a:blip r:embed="rId2" cstate="email">
             <a:extLst>
               <a:ext uri="{28A0092B-C50C-407E-A947-70E740481C1C}">
                 <a14:useLocalDpi xmlns:a14="http://schemas.microsoft.com/office/drawing/2010/main"/>
@@ -5780,17 +5767,8 @@
           <a:p>
             <a:r>
               <a:rPr lang="en-US" dirty="0" smtClean="0"/>
-              <a:t>DevOps for </a:t>
-            </a:r>
-            <a:r>
-              <a:rPr lang="en-US" dirty="0" smtClean="0"/>
-              <a:t>Big Data</a:t>
-            </a:r>
-            <a:r>
-              <a:rPr lang="en-US" dirty="0" smtClean="0"/>
-              <a:t>?</a:t>
-            </a:r>
-            <a:endParaRPr lang="en-US" dirty="0" smtClean="0"/>
+              <a:t>DevOps for Big Data?</a:t>
+            </a:r>
           </a:p>
           <a:p>
             <a:r>
@@ -5879,11 +5857,7 @@
           <a:p>
             <a:r>
               <a:rPr lang="en-US" dirty="0" smtClean="0"/>
-              <a:t>Buying </a:t>
-            </a:r>
-            <a:r>
-              <a:rPr lang="en-US" dirty="0" smtClean="0"/>
-              <a:t>diapers &amp; beer</a:t>
+              <a:t>Buying diapers &amp; beer</a:t>
             </a:r>
             <a:endParaRPr lang="en-US" dirty="0"/>
           </a:p>
@@ -5936,36 +5910,19 @@
           <a:p>
             <a:r>
               <a:rPr lang="en-US" dirty="0" smtClean="0"/>
-              <a:t>Kermit, </a:t>
-            </a:r>
+              <a:t>Kermit, 3½ years old</a:t>
+            </a:r>
+          </a:p>
+          <a:p>
             <a:r>
               <a:rPr lang="en-US" dirty="0" smtClean="0"/>
-              <a:t>3½ years </a:t>
-            </a:r>
+              <a:t>Declan, almost 2</a:t>
+            </a:r>
+          </a:p>
+          <a:p>
             <a:r>
               <a:rPr lang="en-US" dirty="0" smtClean="0"/>
-              <a:t>old</a:t>
-            </a:r>
-          </a:p>
-          <a:p>
-            <a:r>
-              <a:rPr lang="en-US" dirty="0" smtClean="0"/>
-              <a:t>Declan, </a:t>
-            </a:r>
-            <a:r>
-              <a:rPr lang="en-US" dirty="0" smtClean="0"/>
-              <a:t>almost 2</a:t>
-            </a:r>
-            <a:endParaRPr lang="en-US" dirty="0" smtClean="0"/>
-          </a:p>
-          <a:p>
-            <a:r>
-              <a:rPr lang="en-US" dirty="0" smtClean="0"/>
-              <a:t>Virginia, </a:t>
-            </a:r>
-            <a:r>
-              <a:rPr lang="en-US" dirty="0" smtClean="0"/>
-              <a:t>3 months</a:t>
+              <a:t>Virginia, 3 months</a:t>
             </a:r>
             <a:endParaRPr lang="en-US" u="sng" dirty="0"/>
           </a:p>
@@ -6042,7 +5999,7 @@
           <p:nvPr/>
         </p:nvPicPr>
         <p:blipFill>
-          <a:blip r:embed="rId3" cstate="screen">
+          <a:blip r:embed="rId3" cstate="email">
             <a:extLst>
               <a:ext uri="{28A0092B-C50C-407E-A947-70E740481C1C}">
                 <a14:useLocalDpi xmlns:a14="http://schemas.microsoft.com/office/drawing/2010/main"/>
@@ -6086,7 +6043,7 @@
           <p:nvPr/>
         </p:nvPicPr>
         <p:blipFill rotWithShape="1">
-          <a:blip r:embed="rId4" cstate="screen">
+          <a:blip r:embed="rId4" cstate="email">
             <a:extLst>
               <a:ext uri="{BEBA8EAE-BF5A-486C-A8C5-ECC9F3942E4B}">
                 <a14:imgProps xmlns:a14="http://schemas.microsoft.com/office/drawing/2010/main">
@@ -6138,7 +6095,7 @@
           <p:nvPr/>
         </p:nvPicPr>
         <p:blipFill rotWithShape="1">
-          <a:blip r:embed="rId6" cstate="screen">
+          <a:blip r:embed="rId6" cstate="email">
             <a:extLst>
               <a:ext uri="{28A0092B-C50C-407E-A947-70E740481C1C}">
                 <a14:useLocalDpi xmlns:a14="http://schemas.microsoft.com/office/drawing/2010/main"/>
@@ -6637,7 +6594,7 @@
           <p:nvPr/>
         </p:nvPicPr>
         <p:blipFill>
-          <a:blip r:embed="rId2" cstate="screen">
+          <a:blip r:embed="rId2" cstate="email">
             <a:extLst>
               <a:ext uri="{28A0092B-C50C-407E-A947-70E740481C1C}">
                 <a14:useLocalDpi xmlns:a14="http://schemas.microsoft.com/office/drawing/2010/main"/>
@@ -7536,13 +7493,8 @@
             <a:pPr lvl="1"/>
             <a:r>
               <a:rPr lang="en-US" dirty="0" smtClean="0"/>
-              <a:t>You will have the experience of working </a:t>
-            </a:r>
-            <a:r>
-              <a:rPr lang="en-US" dirty="0" smtClean="0"/>
-              <a:t>with an Agile project methodology.</a:t>
-            </a:r>
-            <a:endParaRPr lang="en-US" dirty="0" smtClean="0"/>
+              <a:t>You will have the experience of working with an Agile project methodology.</a:t>
+            </a:r>
           </a:p>
           <a:p>
             <a:pPr lvl="1"/>
@@ -8106,11 +8058,6 @@
               </a:rPr>
               <a:t>As you form teams, you’ll probably want to make sure these specialties are covered:</a:t>
             </a:r>
-            <a:endParaRPr lang="en-US" b="1" dirty="0" smtClean="0">
-              <a:solidFill>
-                <a:schemeClr val="accent2"/>
-              </a:solidFill>
-            </a:endParaRPr>
           </a:p>
           <a:p>
             <a:pPr lvl="1"/>
@@ -8915,22 +8862,13 @@
           <a:p>
             <a:r>
               <a:rPr lang="en-US" dirty="0" smtClean="0"/>
-              <a:t>You can come to both the 10:30 and 1:30 sections if you would like to see more options; but don’t come to a </a:t>
-            </a:r>
+              <a:t>You can come to both the 10:30 and 1:30 sections if you would like to see more options; but don’t come to a different time slot if you’re unwilling to switch to that section for your regular attendance.</a:t>
+            </a:r>
+          </a:p>
+          <a:p>
             <a:r>
               <a:rPr lang="en-US" dirty="0" smtClean="0"/>
-              <a:t>different time slot if you’re unwilling to switch to that section for your regular attendance.</a:t>
-            </a:r>
-            <a:endParaRPr lang="en-US" dirty="0" smtClean="0"/>
-          </a:p>
-          <a:p>
-            <a:r>
-              <a:rPr lang="en-US" dirty="0" smtClean="0"/>
-              <a:t>Each </a:t>
-            </a:r>
-            <a:r>
-              <a:rPr lang="en-US" dirty="0" smtClean="0"/>
-              <a:t>project sponsor will have </a:t>
+              <a:t>Each project sponsor will have </a:t>
             </a:r>
             <a:r>
               <a:rPr lang="en-US" u="sng" dirty="0" smtClean="0"/>
@@ -8944,11 +8882,7 @@
           <a:p>
             <a:r>
               <a:rPr lang="en-US" dirty="0" smtClean="0"/>
-              <a:t>We will then break, so you can talk to them one-on-one and try to find a project and a role that suits your interests and abilities.  Keep in mind the specializations you’re most interested in</a:t>
-            </a:r>
-            <a:r>
-              <a:rPr lang="en-US" dirty="0" smtClean="0"/>
-              <a:t>.</a:t>
+              <a:t>We will then break, so you can talk to them one-on-one and try to find a project and a role that suits your interests and abilities.  Keep in mind the specializations you’re most interested in.</a:t>
             </a:r>
           </a:p>
           <a:p>
@@ -9422,15 +9356,7 @@
           <a:p>
             <a:r>
               <a:rPr lang="en-US" dirty="0" smtClean="0"/>
-              <a:t>ABPR policy </a:t>
-            </a:r>
-            <a:r>
-              <a:rPr lang="en-US" dirty="0" smtClean="0"/>
-              <a:t>is that you’re expected to work outside of class about twice as many hours as in the classroom.  These projects are much easier when you work </a:t>
-            </a:r>
-            <a:r>
-              <a:rPr lang="en-US" dirty="0" smtClean="0"/>
-              <a:t>together instead of </a:t>
+              <a:t>ABPR policy is that you’re expected to work outside of class about twice as many hours as in the classroom.  These projects are much easier when you work together instead of </a:t>
             </a:r>
             <a:r>
               <a:rPr lang="en-US" dirty="0" err="1" smtClean="0"/>
@@ -9438,19 +9364,7 @@
             </a:r>
             <a:r>
               <a:rPr lang="en-US" dirty="0" smtClean="0"/>
-              <a:t>, </a:t>
-            </a:r>
-            <a:r>
-              <a:rPr lang="en-US" dirty="0" smtClean="0"/>
-              <a:t>so I strongly recommend you make a habit of working together with your team for </a:t>
-            </a:r>
-            <a:r>
-              <a:rPr lang="en-US" dirty="0" smtClean="0"/>
-              <a:t>a big block of time after class and/or on the weekends.</a:t>
-            </a:r>
-            <a:r>
-              <a:rPr lang="en-US" dirty="0" smtClean="0"/>
-              <a:t/>
+              <a:t>, so I strongly recommend you make a habit of working together with your team for a big block of time after class and/or on the weekends.</a:t>
             </a:r>
             <a:br>
               <a:rPr lang="en-US" dirty="0" smtClean="0"/>
@@ -9483,11 +9397,7 @@
             </a:r>
             <a:r>
               <a:rPr lang="en-US" dirty="0" smtClean="0"/>
-              <a:t> </a:t>
-            </a:r>
-            <a:r>
-              <a:rPr lang="en-US" dirty="0" smtClean="0"/>
-              <a:t>expected to be able to find resources and ways to learn what you need to know.</a:t>
+              <a:t> expected to be able to find resources and ways to learn what you need to know.</a:t>
             </a:r>
             <a:endParaRPr lang="en-US" dirty="0"/>
           </a:p>
@@ -9947,7 +9857,13 @@
           <p:nvPr/>
         </p:nvPicPr>
         <p:blipFill>
-          <a:blip r:embed="rId3"/>
+          <a:blip r:embed="rId3" cstate="email">
+            <a:extLst>
+              <a:ext uri="{28A0092B-C50C-407E-A947-70E740481C1C}">
+                <a14:useLocalDpi xmlns:a14="http://schemas.microsoft.com/office/drawing/2010/main"/>
+              </a:ext>
+            </a:extLst>
+          </a:blip>
           <a:stretch>
             <a:fillRect/>
           </a:stretch>
@@ -10565,7 +10481,13 @@
           <p:nvPr/>
         </p:nvPicPr>
         <p:blipFill>
-          <a:blip r:embed="rId3"/>
+          <a:blip r:embed="rId3" cstate="email">
+            <a:extLst>
+              <a:ext uri="{28A0092B-C50C-407E-A947-70E740481C1C}">
+                <a14:useLocalDpi xmlns:a14="http://schemas.microsoft.com/office/drawing/2010/main"/>
+              </a:ext>
+            </a:extLst>
+          </a:blip>
           <a:stretch>
             <a:fillRect/>
           </a:stretch>
@@ -11153,15 +11075,7 @@
           <a:p>
             <a:r>
               <a:rPr lang="en-US" dirty="0" smtClean="0"/>
-              <a:t>A </a:t>
-            </a:r>
-            <a:r>
-              <a:rPr lang="en-US" dirty="0" smtClean="0"/>
-              <a:t>starting point:  </a:t>
-            </a:r>
-            <a:r>
-              <a:rPr lang="en-US" dirty="0" smtClean="0"/>
-              <a:t>the </a:t>
+              <a:t>A starting point:  the </a:t>
             </a:r>
             <a:r>
               <a:rPr lang="en-US" dirty="0" smtClean="0">
@@ -11180,15 +11094,7 @@
             </a:br>
             <a:r>
               <a:rPr lang="en-US" dirty="0" smtClean="0"/>
-              <a:t>introduced to </a:t>
-            </a:r>
-            <a:r>
-              <a:rPr lang="en-US" dirty="0" smtClean="0"/>
-              <a:t>operations research in </a:t>
-            </a:r>
-            <a:r>
-              <a:rPr lang="en-US" dirty="0" smtClean="0"/>
-              <a:t>1984</a:t>
+              <a:t>introduced to operations research in 1984</a:t>
             </a:r>
             <a:endParaRPr lang="en-US" dirty="0"/>
           </a:p>
@@ -14541,10 +14447,10 @@
           <p:nvPr/>
         </p:nvPicPr>
         <p:blipFill>
-          <a:blip r:embed="rId3">
+          <a:blip r:embed="rId3" cstate="email">
             <a:extLst>
               <a:ext uri="{28A0092B-C50C-407E-A947-70E740481C1C}">
-                <a14:useLocalDpi xmlns:a14="http://schemas.microsoft.com/office/drawing/2010/main" val="0"/>
+                <a14:useLocalDpi xmlns:a14="http://schemas.microsoft.com/office/drawing/2010/main"/>
               </a:ext>
             </a:extLst>
           </a:blip>
@@ -14605,10 +14511,10 @@
           <p:nvPr/>
         </p:nvPicPr>
         <p:blipFill>
-          <a:blip r:embed="rId4">
+          <a:blip r:embed="rId4" cstate="email">
             <a:extLst>
               <a:ext uri="{28A0092B-C50C-407E-A947-70E740481C1C}">
-                <a14:useLocalDpi xmlns:a14="http://schemas.microsoft.com/office/drawing/2010/main" val="0"/>
+                <a14:useLocalDpi xmlns:a14="http://schemas.microsoft.com/office/drawing/2010/main"/>
               </a:ext>
             </a:extLst>
           </a:blip>
@@ -14669,10 +14575,10 @@
           <p:nvPr/>
         </p:nvPicPr>
         <p:blipFill>
-          <a:blip r:embed="rId5">
+          <a:blip r:embed="rId5" cstate="email">
             <a:extLst>
               <a:ext uri="{28A0092B-C50C-407E-A947-70E740481C1C}">
-                <a14:useLocalDpi xmlns:a14="http://schemas.microsoft.com/office/drawing/2010/main" val="0"/>
+                <a14:useLocalDpi xmlns:a14="http://schemas.microsoft.com/office/drawing/2010/main"/>
               </a:ext>
             </a:extLst>
           </a:blip>
@@ -14733,10 +14639,10 @@
           <p:nvPr/>
         </p:nvPicPr>
         <p:blipFill>
-          <a:blip r:embed="rId6">
+          <a:blip r:embed="rId6" cstate="email">
             <a:extLst>
               <a:ext uri="{28A0092B-C50C-407E-A947-70E740481C1C}">
-                <a14:useLocalDpi xmlns:a14="http://schemas.microsoft.com/office/drawing/2010/main" val="0"/>
+                <a14:useLocalDpi xmlns:a14="http://schemas.microsoft.com/office/drawing/2010/main"/>
               </a:ext>
             </a:extLst>
           </a:blip>
@@ -15859,14 +15765,14 @@
           <p:nvPr/>
         </p:nvPicPr>
         <p:blipFill>
-          <a:blip r:embed="rId3">
+          <a:blip r:embed="rId3" cstate="email">
             <a:extLst>
               <a:ext uri="{28A0092B-C50C-407E-A947-70E740481C1C}">
-                <a14:useLocalDpi xmlns:a14="http://schemas.microsoft.com/office/drawing/2010/main" val="0"/>
+                <a14:useLocalDpi xmlns:a14="http://schemas.microsoft.com/office/drawing/2010/main"/>
               </a:ext>
             </a:extLst>
           </a:blip>
-          <a:srcRect l="8337"/>
+          <a:srcRect/>
           <a:stretch>
             <a:fillRect/>
           </a:stretch>
@@ -16514,10 +16420,10 @@
           <p:nvPr/>
         </p:nvPicPr>
         <p:blipFill>
-          <a:blip r:embed="rId4">
+          <a:blip r:embed="rId4" cstate="email">
             <a:extLst>
               <a:ext uri="{28A0092B-C50C-407E-A947-70E740481C1C}">
-                <a14:useLocalDpi xmlns:a14="http://schemas.microsoft.com/office/drawing/2010/main" val="0"/>
+                <a14:useLocalDpi xmlns:a14="http://schemas.microsoft.com/office/drawing/2010/main"/>
               </a:ext>
             </a:extLst>
           </a:blip>
@@ -16578,10 +16484,10 @@
           <p:nvPr/>
         </p:nvPicPr>
         <p:blipFill>
-          <a:blip r:embed="rId5">
+          <a:blip r:embed="rId5" cstate="email">
             <a:extLst>
               <a:ext uri="{28A0092B-C50C-407E-A947-70E740481C1C}">
-                <a14:useLocalDpi xmlns:a14="http://schemas.microsoft.com/office/drawing/2010/main" val="0"/>
+                <a14:useLocalDpi xmlns:a14="http://schemas.microsoft.com/office/drawing/2010/main"/>
               </a:ext>
             </a:extLst>
           </a:blip>
@@ -16642,10 +16548,10 @@
           <p:nvPr/>
         </p:nvPicPr>
         <p:blipFill>
-          <a:blip r:embed="rId6">
+          <a:blip r:embed="rId6" cstate="email">
             <a:extLst>
               <a:ext uri="{28A0092B-C50C-407E-A947-70E740481C1C}">
-                <a14:useLocalDpi xmlns:a14="http://schemas.microsoft.com/office/drawing/2010/main" val="0"/>
+                <a14:useLocalDpi xmlns:a14="http://schemas.microsoft.com/office/drawing/2010/main"/>
               </a:ext>
             </a:extLst>
           </a:blip>
@@ -17117,10 +17023,10 @@
           <p:nvPr/>
         </p:nvPicPr>
         <p:blipFill>
-          <a:blip r:embed="rId3">
+          <a:blip r:embed="rId3" cstate="email">
             <a:extLst>
               <a:ext uri="{28A0092B-C50C-407E-A947-70E740481C1C}">
-                <a14:useLocalDpi xmlns:a14="http://schemas.microsoft.com/office/drawing/2010/main" val="0"/>
+                <a14:useLocalDpi xmlns:a14="http://schemas.microsoft.com/office/drawing/2010/main"/>
               </a:ext>
             </a:extLst>
           </a:blip>

</xml_diff>